<commit_message>
start of an edit order screen
</commit_message>
<xml_diff>
--- a/documentation/DB Schema/DB Schema - Project - COMP3005.pptx
+++ b/documentation/DB Schema/DB Schema - Project - COMP3005.pptx
@@ -259,7 +259,7 @@
           <a:p>
             <a:fld id="{3B546F91-8DBE-7B47-84B1-9B2369F377BE}" type="datetimeFigureOut">
               <a:rPr lang="en-US" smtClean="0"/>
-              <a:t>4/9/20</a:t>
+              <a:t>4/10/20</a:t>
             </a:fld>
             <a:endParaRPr lang="en-US"/>
           </a:p>
@@ -457,7 +457,7 @@
           <a:p>
             <a:fld id="{3B546F91-8DBE-7B47-84B1-9B2369F377BE}" type="datetimeFigureOut">
               <a:rPr lang="en-US" smtClean="0"/>
-              <a:t>4/9/20</a:t>
+              <a:t>4/10/20</a:t>
             </a:fld>
             <a:endParaRPr lang="en-US"/>
           </a:p>
@@ -665,7 +665,7 @@
           <a:p>
             <a:fld id="{3B546F91-8DBE-7B47-84B1-9B2369F377BE}" type="datetimeFigureOut">
               <a:rPr lang="en-US" smtClean="0"/>
-              <a:t>4/9/20</a:t>
+              <a:t>4/10/20</a:t>
             </a:fld>
             <a:endParaRPr lang="en-US"/>
           </a:p>
@@ -863,7 +863,7 @@
           <a:p>
             <a:fld id="{3B546F91-8DBE-7B47-84B1-9B2369F377BE}" type="datetimeFigureOut">
               <a:rPr lang="en-US" smtClean="0"/>
-              <a:t>4/9/20</a:t>
+              <a:t>4/10/20</a:t>
             </a:fld>
             <a:endParaRPr lang="en-US"/>
           </a:p>
@@ -1138,7 +1138,7 @@
           <a:p>
             <a:fld id="{3B546F91-8DBE-7B47-84B1-9B2369F377BE}" type="datetimeFigureOut">
               <a:rPr lang="en-US" smtClean="0"/>
-              <a:t>4/9/20</a:t>
+              <a:t>4/10/20</a:t>
             </a:fld>
             <a:endParaRPr lang="en-US"/>
           </a:p>
@@ -1403,7 +1403,7 @@
           <a:p>
             <a:fld id="{3B546F91-8DBE-7B47-84B1-9B2369F377BE}" type="datetimeFigureOut">
               <a:rPr lang="en-US" smtClean="0"/>
-              <a:t>4/9/20</a:t>
+              <a:t>4/10/20</a:t>
             </a:fld>
             <a:endParaRPr lang="en-US"/>
           </a:p>
@@ -1815,7 +1815,7 @@
           <a:p>
             <a:fld id="{3B546F91-8DBE-7B47-84B1-9B2369F377BE}" type="datetimeFigureOut">
               <a:rPr lang="en-US" smtClean="0"/>
-              <a:t>4/9/20</a:t>
+              <a:t>4/10/20</a:t>
             </a:fld>
             <a:endParaRPr lang="en-US"/>
           </a:p>
@@ -1956,7 +1956,7 @@
           <a:p>
             <a:fld id="{3B546F91-8DBE-7B47-84B1-9B2369F377BE}" type="datetimeFigureOut">
               <a:rPr lang="en-US" smtClean="0"/>
-              <a:t>4/9/20</a:t>
+              <a:t>4/10/20</a:t>
             </a:fld>
             <a:endParaRPr lang="en-US"/>
           </a:p>
@@ -2069,7 +2069,7 @@
           <a:p>
             <a:fld id="{3B546F91-8DBE-7B47-84B1-9B2369F377BE}" type="datetimeFigureOut">
               <a:rPr lang="en-US" smtClean="0"/>
-              <a:t>4/9/20</a:t>
+              <a:t>4/10/20</a:t>
             </a:fld>
             <a:endParaRPr lang="en-US"/>
           </a:p>
@@ -2380,7 +2380,7 @@
           <a:p>
             <a:fld id="{3B546F91-8DBE-7B47-84B1-9B2369F377BE}" type="datetimeFigureOut">
               <a:rPr lang="en-US" smtClean="0"/>
-              <a:t>4/9/20</a:t>
+              <a:t>4/10/20</a:t>
             </a:fld>
             <a:endParaRPr lang="en-US"/>
           </a:p>
@@ -2668,7 +2668,7 @@
           <a:p>
             <a:fld id="{3B546F91-8DBE-7B47-84B1-9B2369F377BE}" type="datetimeFigureOut">
               <a:rPr lang="en-US" smtClean="0"/>
-              <a:t>4/9/20</a:t>
+              <a:t>4/10/20</a:t>
             </a:fld>
             <a:endParaRPr lang="en-US"/>
           </a:p>
@@ -2909,7 +2909,7 @@
           <a:p>
             <a:fld id="{3B546F91-8DBE-7B47-84B1-9B2369F377BE}" type="datetimeFigureOut">
               <a:rPr lang="en-US" smtClean="0"/>
-              <a:t>4/9/20</a:t>
+              <a:t>4/10/20</a:t>
             </a:fld>
             <a:endParaRPr lang="en-US"/>
           </a:p>
@@ -3341,14 +3341,14 @@
           <p:nvPr>
             <p:extLst>
               <p:ext uri="{D42A27DB-BD31-4B8C-83A1-F6EECF244321}">
-                <p14:modId xmlns:p14="http://schemas.microsoft.com/office/powerpoint/2010/main" val="3113896380"/>
+                <p14:modId xmlns:p14="http://schemas.microsoft.com/office/powerpoint/2010/main" val="4253127913"/>
               </p:ext>
             </p:extLst>
           </p:nvPr>
         </p:nvGraphicFramePr>
         <p:xfrm>
-          <a:off x="1826535" y="3253663"/>
-          <a:ext cx="1078230" cy="1163257"/>
+          <a:off x="1826535" y="3184090"/>
+          <a:ext cx="1078230" cy="1280160"/>
         </p:xfrm>
         <a:graphic>
           <a:graphicData uri="http://schemas.openxmlformats.org/drawingml/2006/table">
@@ -3485,6 +3485,15 @@
                           <a:latin typeface="Times" pitchFamily="2" charset="0"/>
                         </a:rPr>
                         <a:t>()</a:t>
+                      </a:r>
+                    </a:p>
+                    <a:p>
+                      <a:pPr algn="l"/>
+                      <a:r>
+                        <a:rPr lang="en-US" sz="1200" u="none" dirty="0">
+                          <a:latin typeface="Times" pitchFamily="2" charset="0"/>
+                        </a:rPr>
+                        <a:t>status</a:t>
                       </a:r>
                     </a:p>
                   </a:txBody>
@@ -7232,7 +7241,7 @@
         <p:spPr>
           <a:xfrm>
             <a:off x="2365650" y="2890242"/>
-            <a:ext cx="0" cy="363421"/>
+            <a:ext cx="0" cy="293848"/>
           </a:xfrm>
           <a:prstGeom prst="straightConnector1">
             <a:avLst/>
@@ -7274,8 +7283,8 @@
         </p:nvCxnSpPr>
         <p:spPr>
           <a:xfrm flipV="1">
-            <a:off x="2365650" y="4416920"/>
-            <a:ext cx="0" cy="321782"/>
+            <a:off x="2365650" y="4464250"/>
+            <a:ext cx="0" cy="274452"/>
           </a:xfrm>
           <a:prstGeom prst="straightConnector1">
             <a:avLst/>

</xml_diff>